<commit_message>
Added drogue labeling slides.
</commit_message>
<xml_diff>
--- a/man-labels.pptx
+++ b/man-labels.pptx
@@ -5,7 +5,8 @@
     <p:sldMasterId id="2147483648" r:id="rId1"/>
   </p:sldMasterIdLst>
   <p:sldIdLst>
-    <p:sldId id="257" r:id="rId2"/>
+    <p:sldId id="258" r:id="rId2"/>
+    <p:sldId id="257" r:id="rId3"/>
   </p:sldIdLst>
   <p:sldSz cx="12192000" cy="6858000"/>
   <p:notesSz cx="6858000" cy="9144000"/>
@@ -259,7 +260,7 @@
           <a:p>
             <a:fld id="{3D82B58C-D7E7-424D-B8F6-D0107156B31A}" type="datetimeFigureOut">
               <a:rPr lang="en-US" smtClean="0"/>
-              <a:t>3/29/2024</a:t>
+              <a:t>4/1/2024</a:t>
             </a:fld>
             <a:endParaRPr lang="en-US"/>
           </a:p>
@@ -457,7 +458,7 @@
           <a:p>
             <a:fld id="{3D82B58C-D7E7-424D-B8F6-D0107156B31A}" type="datetimeFigureOut">
               <a:rPr lang="en-US" smtClean="0"/>
-              <a:t>3/29/2024</a:t>
+              <a:t>4/1/2024</a:t>
             </a:fld>
             <a:endParaRPr lang="en-US"/>
           </a:p>
@@ -665,7 +666,7 @@
           <a:p>
             <a:fld id="{3D82B58C-D7E7-424D-B8F6-D0107156B31A}" type="datetimeFigureOut">
               <a:rPr lang="en-US" smtClean="0"/>
-              <a:t>3/29/2024</a:t>
+              <a:t>4/1/2024</a:t>
             </a:fld>
             <a:endParaRPr lang="en-US"/>
           </a:p>
@@ -863,7 +864,7 @@
           <a:p>
             <a:fld id="{3D82B58C-D7E7-424D-B8F6-D0107156B31A}" type="datetimeFigureOut">
               <a:rPr lang="en-US" smtClean="0"/>
-              <a:t>3/29/2024</a:t>
+              <a:t>4/1/2024</a:t>
             </a:fld>
             <a:endParaRPr lang="en-US"/>
           </a:p>
@@ -1138,7 +1139,7 @@
           <a:p>
             <a:fld id="{3D82B58C-D7E7-424D-B8F6-D0107156B31A}" type="datetimeFigureOut">
               <a:rPr lang="en-US" smtClean="0"/>
-              <a:t>3/29/2024</a:t>
+              <a:t>4/1/2024</a:t>
             </a:fld>
             <a:endParaRPr lang="en-US"/>
           </a:p>
@@ -1403,7 +1404,7 @@
           <a:p>
             <a:fld id="{3D82B58C-D7E7-424D-B8F6-D0107156B31A}" type="datetimeFigureOut">
               <a:rPr lang="en-US" smtClean="0"/>
-              <a:t>3/29/2024</a:t>
+              <a:t>4/1/2024</a:t>
             </a:fld>
             <a:endParaRPr lang="en-US"/>
           </a:p>
@@ -1815,7 +1816,7 @@
           <a:p>
             <a:fld id="{3D82B58C-D7E7-424D-B8F6-D0107156B31A}" type="datetimeFigureOut">
               <a:rPr lang="en-US" smtClean="0"/>
-              <a:t>3/29/2024</a:t>
+              <a:t>4/1/2024</a:t>
             </a:fld>
             <a:endParaRPr lang="en-US"/>
           </a:p>
@@ -1956,7 +1957,7 @@
           <a:p>
             <a:fld id="{3D82B58C-D7E7-424D-B8F6-D0107156B31A}" type="datetimeFigureOut">
               <a:rPr lang="en-US" smtClean="0"/>
-              <a:t>3/29/2024</a:t>
+              <a:t>4/1/2024</a:t>
             </a:fld>
             <a:endParaRPr lang="en-US"/>
           </a:p>
@@ -2069,7 +2070,7 @@
           <a:p>
             <a:fld id="{3D82B58C-D7E7-424D-B8F6-D0107156B31A}" type="datetimeFigureOut">
               <a:rPr lang="en-US" smtClean="0"/>
-              <a:t>3/29/2024</a:t>
+              <a:t>4/1/2024</a:t>
             </a:fld>
             <a:endParaRPr lang="en-US"/>
           </a:p>
@@ -2380,7 +2381,7 @@
           <a:p>
             <a:fld id="{3D82B58C-D7E7-424D-B8F6-D0107156B31A}" type="datetimeFigureOut">
               <a:rPr lang="en-US" smtClean="0"/>
-              <a:t>3/29/2024</a:t>
+              <a:t>4/1/2024</a:t>
             </a:fld>
             <a:endParaRPr lang="en-US"/>
           </a:p>
@@ -2668,7 +2669,7 @@
           <a:p>
             <a:fld id="{3D82B58C-D7E7-424D-B8F6-D0107156B31A}" type="datetimeFigureOut">
               <a:rPr lang="en-US" smtClean="0"/>
-              <a:t>3/29/2024</a:t>
+              <a:t>4/1/2024</a:t>
             </a:fld>
             <a:endParaRPr lang="en-US"/>
           </a:p>
@@ -2909,7 +2910,7 @@
           <a:p>
             <a:fld id="{3D82B58C-D7E7-424D-B8F6-D0107156B31A}" type="datetimeFigureOut">
               <a:rPr lang="en-US" smtClean="0"/>
-              <a:t>3/29/2024</a:t>
+              <a:t>4/1/2024</a:t>
             </a:fld>
             <a:endParaRPr lang="en-US"/>
           </a:p>
@@ -3328,10 +3329,105 @@
       </p:grpSpPr>
       <p:pic>
         <p:nvPicPr>
-          <p:cNvPr id="3" name="Picture 2" descr="A pipe in a room&#10;&#10;Description automatically generated with medium confidence">
-            <a:extLst>
-              <a:ext uri="{FF2B5EF4-FFF2-40B4-BE49-F238E27FC236}">
-                <a16:creationId xmlns:a16="http://schemas.microsoft.com/office/drawing/2014/main" id="{064B48F8-480C-7F31-6E52-8092DA251B82}"/>
+          <p:cNvPr id="5" name="Picture 4" descr="A close-up of a stage&#10;&#10;Description automatically generated">
+            <a:extLst>
+              <a:ext uri="{FF2B5EF4-FFF2-40B4-BE49-F238E27FC236}">
+                <a16:creationId xmlns:a16="http://schemas.microsoft.com/office/drawing/2014/main" id="{F121F2B3-EC76-E469-EEB4-9A5D80288D05}"/>
+              </a:ext>
+            </a:extLst>
+          </p:cNvPr>
+          <p:cNvPicPr>
+            <a:picLocks noChangeAspect="1"/>
+          </p:cNvPicPr>
+          <p:nvPr/>
+        </p:nvPicPr>
+        <p:blipFill>
+          <a:blip r:embed="rId2">
+            <a:extLst>
+              <a:ext uri="{28A0092B-C50C-407E-A947-70E740481C1C}">
+                <a14:useLocalDpi xmlns:a14="http://schemas.microsoft.com/office/drawing/2010/main" val="0"/>
+              </a:ext>
+            </a:extLst>
+          </a:blip>
+          <a:stretch>
+            <a:fillRect/>
+          </a:stretch>
+        </p:blipFill>
+        <p:spPr>
+          <a:xfrm>
+            <a:off x="6096000" y="381000"/>
+            <a:ext cx="6096000" cy="6096000"/>
+          </a:xfrm>
+          <a:prstGeom prst="rect">
+            <a:avLst/>
+          </a:prstGeom>
+        </p:spPr>
+      </p:pic>
+      <p:pic>
+        <p:nvPicPr>
+          <p:cNvPr id="9" name="Picture 8">
+            <a:extLst>
+              <a:ext uri="{FF2B5EF4-FFF2-40B4-BE49-F238E27FC236}">
+                <a16:creationId xmlns:a16="http://schemas.microsoft.com/office/drawing/2014/main" id="{82FDC67C-1AB2-EB2A-8BEA-BFF6CC26889C}"/>
+              </a:ext>
+            </a:extLst>
+          </p:cNvPr>
+          <p:cNvPicPr>
+            <a:picLocks noChangeAspect="1"/>
+          </p:cNvPicPr>
+          <p:nvPr/>
+        </p:nvPicPr>
+        <p:blipFill rotWithShape="1">
+          <a:blip r:embed="rId3"/>
+          <a:srcRect l="-1" t="2917" r="408" b="-1"/>
+          <a:stretch/>
+        </p:blipFill>
+        <p:spPr>
+          <a:xfrm>
+            <a:off x="0" y="382204"/>
+            <a:ext cx="6096000" cy="6094796"/>
+          </a:xfrm>
+          <a:prstGeom prst="rect">
+            <a:avLst/>
+          </a:prstGeom>
+        </p:spPr>
+      </p:pic>
+    </p:spTree>
+    <p:extLst>
+      <p:ext uri="{BB962C8B-B14F-4D97-AF65-F5344CB8AC3E}">
+        <p14:creationId xmlns:p14="http://schemas.microsoft.com/office/powerpoint/2010/main" val="3263821358"/>
+      </p:ext>
+    </p:extLst>
+  </p:cSld>
+  <p:clrMapOvr>
+    <a:masterClrMapping/>
+  </p:clrMapOvr>
+</p:sld>
+</file>
+
+<file path=ppt/slides/slide2.xml><?xml version="1.0" encoding="utf-8"?>
+<p:sld xmlns:a="http://schemas.openxmlformats.org/drawingml/2006/main" xmlns:r="http://schemas.openxmlformats.org/officeDocument/2006/relationships" xmlns:p="http://schemas.openxmlformats.org/presentationml/2006/main">
+  <p:cSld>
+    <p:spTree>
+      <p:nvGrpSpPr>
+        <p:cNvPr id="1" name=""/>
+        <p:cNvGrpSpPr/>
+        <p:nvPr/>
+      </p:nvGrpSpPr>
+      <p:grpSpPr>
+        <a:xfrm>
+          <a:off x="0" y="0"/>
+          <a:ext cx="0" cy="0"/>
+          <a:chOff x="0" y="0"/>
+          <a:chExt cx="0" cy="0"/>
+        </a:xfrm>
+      </p:grpSpPr>
+      <p:pic>
+        <p:nvPicPr>
+          <p:cNvPr id="5" name="Picture 4" descr="A room with many speakers and a pipe&#10;&#10;Description automatically generated with medium confidence">
+            <a:extLst>
+              <a:ext uri="{FF2B5EF4-FFF2-40B4-BE49-F238E27FC236}">
+                <a16:creationId xmlns:a16="http://schemas.microsoft.com/office/drawing/2014/main" id="{9FD387A6-1C95-7B8C-3E9E-5FF6A4567F85}"/>
               </a:ext>
             </a:extLst>
           </p:cNvPr>

</xml_diff>